<commit_message>
Resolvendo problema de popular estado correto
</commit_message>
<xml_diff>
--- a/Presentation1.pptx
+++ b/Presentation1.pptx
@@ -111,6 +111,11 @@
       </a:defRPr>
     </a:lvl9pPr>
   </p:defaultTextStyle>
+  <p:extLst>
+    <p:ext uri="{EFAFB233-063F-42B5-8137-9DF3F51BA10A}">
+      <p15:sldGuideLst xmlns:p15="http://schemas.microsoft.com/office/powerpoint/2012/main"/>
+    </p:ext>
+  </p:extLst>
 </p:presentation>
 </file>
 
@@ -261,7 +266,7 @@
           <a:p>
             <a:fld id="{CD0688EB-ADE1-4404-B05E-D7EDEE8F51AE}" type="datetimeFigureOut">
               <a:rPr lang="en-US" smtClean="0"/>
-              <a:t>4/29/2020</a:t>
+              <a:t>4/30/2020</a:t>
             </a:fld>
             <a:endParaRPr lang="en-US"/>
           </a:p>
@@ -459,7 +464,7 @@
           <a:p>
             <a:fld id="{CD0688EB-ADE1-4404-B05E-D7EDEE8F51AE}" type="datetimeFigureOut">
               <a:rPr lang="en-US" smtClean="0"/>
-              <a:t>4/29/2020</a:t>
+              <a:t>4/30/2020</a:t>
             </a:fld>
             <a:endParaRPr lang="en-US"/>
           </a:p>
@@ -667,7 +672,7 @@
           <a:p>
             <a:fld id="{CD0688EB-ADE1-4404-B05E-D7EDEE8F51AE}" type="datetimeFigureOut">
               <a:rPr lang="en-US" smtClean="0"/>
-              <a:t>4/29/2020</a:t>
+              <a:t>4/30/2020</a:t>
             </a:fld>
             <a:endParaRPr lang="en-US"/>
           </a:p>
@@ -865,7 +870,7 @@
           <a:p>
             <a:fld id="{CD0688EB-ADE1-4404-B05E-D7EDEE8F51AE}" type="datetimeFigureOut">
               <a:rPr lang="en-US" smtClean="0"/>
-              <a:t>4/29/2020</a:t>
+              <a:t>4/30/2020</a:t>
             </a:fld>
             <a:endParaRPr lang="en-US"/>
           </a:p>
@@ -1140,7 +1145,7 @@
           <a:p>
             <a:fld id="{CD0688EB-ADE1-4404-B05E-D7EDEE8F51AE}" type="datetimeFigureOut">
               <a:rPr lang="en-US" smtClean="0"/>
-              <a:t>4/29/2020</a:t>
+              <a:t>4/30/2020</a:t>
             </a:fld>
             <a:endParaRPr lang="en-US"/>
           </a:p>
@@ -1405,7 +1410,7 @@
           <a:p>
             <a:fld id="{CD0688EB-ADE1-4404-B05E-D7EDEE8F51AE}" type="datetimeFigureOut">
               <a:rPr lang="en-US" smtClean="0"/>
-              <a:t>4/29/2020</a:t>
+              <a:t>4/30/2020</a:t>
             </a:fld>
             <a:endParaRPr lang="en-US"/>
           </a:p>
@@ -1817,7 +1822,7 @@
           <a:p>
             <a:fld id="{CD0688EB-ADE1-4404-B05E-D7EDEE8F51AE}" type="datetimeFigureOut">
               <a:rPr lang="en-US" smtClean="0"/>
-              <a:t>4/29/2020</a:t>
+              <a:t>4/30/2020</a:t>
             </a:fld>
             <a:endParaRPr lang="en-US"/>
           </a:p>
@@ -1958,7 +1963,7 @@
           <a:p>
             <a:fld id="{CD0688EB-ADE1-4404-B05E-D7EDEE8F51AE}" type="datetimeFigureOut">
               <a:rPr lang="en-US" smtClean="0"/>
-              <a:t>4/29/2020</a:t>
+              <a:t>4/30/2020</a:t>
             </a:fld>
             <a:endParaRPr lang="en-US"/>
           </a:p>
@@ -2071,7 +2076,7 @@
           <a:p>
             <a:fld id="{CD0688EB-ADE1-4404-B05E-D7EDEE8F51AE}" type="datetimeFigureOut">
               <a:rPr lang="en-US" smtClean="0"/>
-              <a:t>4/29/2020</a:t>
+              <a:t>4/30/2020</a:t>
             </a:fld>
             <a:endParaRPr lang="en-US"/>
           </a:p>
@@ -2382,7 +2387,7 @@
           <a:p>
             <a:fld id="{CD0688EB-ADE1-4404-B05E-D7EDEE8F51AE}" type="datetimeFigureOut">
               <a:rPr lang="en-US" smtClean="0"/>
-              <a:t>4/29/2020</a:t>
+              <a:t>4/30/2020</a:t>
             </a:fld>
             <a:endParaRPr lang="en-US"/>
           </a:p>
@@ -2670,7 +2675,7 @@
           <a:p>
             <a:fld id="{CD0688EB-ADE1-4404-B05E-D7EDEE8F51AE}" type="datetimeFigureOut">
               <a:rPr lang="en-US" smtClean="0"/>
-              <a:t>4/29/2020</a:t>
+              <a:t>4/30/2020</a:t>
             </a:fld>
             <a:endParaRPr lang="en-US"/>
           </a:p>
@@ -2911,7 +2916,7 @@
           <a:p>
             <a:fld id="{CD0688EB-ADE1-4404-B05E-D7EDEE8F51AE}" type="datetimeFigureOut">
               <a:rPr lang="en-US" smtClean="0"/>
-              <a:t>4/29/2020</a:t>
+              <a:t>4/30/2020</a:t>
             </a:fld>
             <a:endParaRPr lang="en-US"/>
           </a:p>
@@ -3336,6 +3341,60 @@
           <a:chExt cx="0" cy="0"/>
         </a:xfrm>
       </p:grpSpPr>
+      <p:sp>
+        <p:nvSpPr>
+          <p:cNvPr id="2" name="Rectangle: Rounded Corners 1">
+            <a:extLst>
+              <a:ext uri="{FF2B5EF4-FFF2-40B4-BE49-F238E27FC236}">
+                <a16:creationId xmlns:a16="http://schemas.microsoft.com/office/drawing/2014/main" id="{E1CEA914-C341-497B-B6F1-87D08F41C9B1}"/>
+              </a:ext>
+            </a:extLst>
+          </p:cNvPr>
+          <p:cNvSpPr/>
+          <p:nvPr/>
+        </p:nvSpPr>
+        <p:spPr>
+          <a:xfrm>
+            <a:off x="5956183" y="4655890"/>
+            <a:ext cx="4630723" cy="1677798"/>
+          </a:xfrm>
+          <a:prstGeom prst="roundRect">
+            <a:avLst/>
+          </a:prstGeom>
+          <a:solidFill>
+            <a:schemeClr val="bg1"/>
+          </a:solidFill>
+          <a:ln>
+            <a:solidFill>
+              <a:schemeClr val="bg1"/>
+            </a:solidFill>
+          </a:ln>
+        </p:spPr>
+        <p:style>
+          <a:lnRef idx="2">
+            <a:schemeClr val="accent1">
+              <a:shade val="50000"/>
+            </a:schemeClr>
+          </a:lnRef>
+          <a:fillRef idx="1">
+            <a:schemeClr val="accent1"/>
+          </a:fillRef>
+          <a:effectRef idx="0">
+            <a:schemeClr val="accent1"/>
+          </a:effectRef>
+          <a:fontRef idx="minor">
+            <a:schemeClr val="lt1"/>
+          </a:fontRef>
+        </p:style>
+        <p:txBody>
+          <a:bodyPr rtlCol="0" anchor="ctr"/>
+          <a:lstStyle/>
+          <a:p>
+            <a:pPr algn="ctr"/>
+            <a:endParaRPr lang="en-US"/>
+          </a:p>
+        </p:txBody>
+      </p:sp>
       <p:pic>
         <p:nvPicPr>
           <p:cNvPr id="6" name="Picture 5">
@@ -3380,7 +3439,7 @@
         </p:nvSpPr>
         <p:spPr>
           <a:xfrm>
-            <a:off x="6199465" y="4838350"/>
+            <a:off x="6199464" y="4838349"/>
             <a:ext cx="7071919" cy="1200329"/>
           </a:xfrm>
           <a:prstGeom prst="rect">
@@ -3397,7 +3456,9 @@
             <a:r>
               <a:rPr lang="en-US" sz="2400" u="sng" dirty="0" err="1">
                 <a:solidFill>
-                  <a:schemeClr val="bg1"/>
+                  <a:schemeClr val="bg2">
+                    <a:lumMod val="50000"/>
+                  </a:schemeClr>
                 </a:solidFill>
                 <a:latin typeface="Open Sans" panose="020B0606030504020204" pitchFamily="34" charset="0"/>
                 <a:ea typeface="Open Sans" panose="020B0606030504020204" pitchFamily="34" charset="0"/>
@@ -3408,71 +3469,39 @@
             <a:r>
               <a:rPr lang="en-US" sz="2400" u="sng" dirty="0">
                 <a:solidFill>
-                  <a:schemeClr val="bg1"/>
+                  <a:schemeClr val="bg2">
+                    <a:lumMod val="50000"/>
+                  </a:schemeClr>
                 </a:solidFill>
                 <a:latin typeface="Open Sans" panose="020B0606030504020204" pitchFamily="34" charset="0"/>
                 <a:ea typeface="Open Sans" panose="020B0606030504020204" pitchFamily="34" charset="0"/>
                 <a:cs typeface="Open Sans" panose="020B0606030504020204" pitchFamily="34" charset="0"/>
               </a:rPr>
-              <a:t> modulo 2 - </a:t>
-            </a:r>
-            <a:r>
-              <a:rPr lang="en-US" sz="2400" u="sng" dirty="0" err="1">
-                <a:solidFill>
-                  <a:schemeClr val="bg1"/>
+              <a:t> modulo 2</a:t>
+            </a:r>
+          </a:p>
+          <a:p>
+            <a:r>
+              <a:rPr lang="en-US" sz="2400" dirty="0">
+                <a:solidFill>
+                  <a:schemeClr val="bg2">
+                    <a:lumMod val="50000"/>
+                  </a:schemeClr>
                 </a:solidFill>
                 <a:latin typeface="Open Sans" panose="020B0606030504020204" pitchFamily="34" charset="0"/>
                 <a:ea typeface="Open Sans" panose="020B0606030504020204" pitchFamily="34" charset="0"/>
                 <a:cs typeface="Open Sans" panose="020B0606030504020204" pitchFamily="34" charset="0"/>
               </a:rPr>
-              <a:t>IronHack</a:t>
-            </a:r>
-            <a:endParaRPr lang="en-US" sz="2400" u="sng" dirty="0">
-              <a:solidFill>
-                <a:schemeClr val="bg1"/>
-              </a:solidFill>
-              <a:latin typeface="Open Sans" panose="020B0606030504020204" pitchFamily="34" charset="0"/>
-              <a:ea typeface="Open Sans" panose="020B0606030504020204" pitchFamily="34" charset="0"/>
-              <a:cs typeface="Open Sans" panose="020B0606030504020204" pitchFamily="34" charset="0"/>
-            </a:endParaRPr>
+              <a:t>João Juliatti</a:t>
+            </a:r>
           </a:p>
           <a:p>
             <a:r>
               <a:rPr lang="en-US" sz="2400" dirty="0">
                 <a:solidFill>
-                  <a:schemeClr val="bg1"/>
-                </a:solidFill>
-                <a:latin typeface="Open Sans" panose="020B0606030504020204" pitchFamily="34" charset="0"/>
-                <a:ea typeface="Open Sans" panose="020B0606030504020204" pitchFamily="34" charset="0"/>
-                <a:cs typeface="Open Sans" panose="020B0606030504020204" pitchFamily="34" charset="0"/>
-              </a:rPr>
-              <a:t>João </a:t>
-            </a:r>
-            <a:r>
-              <a:rPr lang="en-US" sz="2400" dirty="0" err="1">
-                <a:solidFill>
-                  <a:schemeClr val="bg1"/>
-                </a:solidFill>
-                <a:latin typeface="Open Sans" panose="020B0606030504020204" pitchFamily="34" charset="0"/>
-                <a:ea typeface="Open Sans" panose="020B0606030504020204" pitchFamily="34" charset="0"/>
-                <a:cs typeface="Open Sans" panose="020B0606030504020204" pitchFamily="34" charset="0"/>
-              </a:rPr>
-              <a:t>Juliatti</a:t>
-            </a:r>
-            <a:endParaRPr lang="en-US" sz="2400" dirty="0">
-              <a:solidFill>
-                <a:schemeClr val="bg1"/>
-              </a:solidFill>
-              <a:latin typeface="Open Sans" panose="020B0606030504020204" pitchFamily="34" charset="0"/>
-              <a:ea typeface="Open Sans" panose="020B0606030504020204" pitchFamily="34" charset="0"/>
-              <a:cs typeface="Open Sans" panose="020B0606030504020204" pitchFamily="34" charset="0"/>
-            </a:endParaRPr>
-          </a:p>
-          <a:p>
-            <a:r>
-              <a:rPr lang="en-US" sz="2400" dirty="0">
-                <a:solidFill>
-                  <a:schemeClr val="bg1"/>
+                  <a:schemeClr val="bg2">
+                    <a:lumMod val="50000"/>
+                  </a:schemeClr>
                 </a:solidFill>
                 <a:latin typeface="Open Sans" panose="020B0606030504020204" pitchFamily="34" charset="0"/>
                 <a:ea typeface="Open Sans" panose="020B0606030504020204" pitchFamily="34" charset="0"/>
@@ -3568,252 +3597,693 @@
           <a:lstStyle/>
           <a:p>
             <a:r>
-              <a:rPr lang="en-US" b="1" dirty="0"/>
+              <a:rPr lang="en-US" b="1" dirty="0">
+                <a:solidFill>
+                  <a:schemeClr val="tx1">
+                    <a:lumMod val="65000"/>
+                    <a:lumOff val="35000"/>
+                  </a:schemeClr>
+                </a:solidFill>
+              </a:rPr>
               <a:t>Portal </a:t>
             </a:r>
             <a:r>
-              <a:rPr lang="en-US" b="1" dirty="0" err="1"/>
+              <a:rPr lang="en-US" b="1" dirty="0" err="1">
+                <a:solidFill>
+                  <a:schemeClr val="tx1">
+                    <a:lumMod val="65000"/>
+                    <a:lumOff val="35000"/>
+                  </a:schemeClr>
+                </a:solidFill>
+              </a:rPr>
               <a:t>IronMedic</a:t>
             </a:r>
             <a:r>
-              <a:rPr lang="en-US" b="1" dirty="0"/>
+              <a:rPr lang="en-US" b="1" dirty="0">
+                <a:solidFill>
+                  <a:schemeClr val="tx1">
+                    <a:lumMod val="65000"/>
+                    <a:lumOff val="35000"/>
+                  </a:schemeClr>
+                </a:solidFill>
+              </a:rPr>
               <a:t> – </a:t>
             </a:r>
             <a:r>
-              <a:rPr lang="en-US" b="1" dirty="0" err="1"/>
+              <a:rPr lang="en-US" b="1" dirty="0" err="1">
+                <a:solidFill>
+                  <a:schemeClr val="tx1">
+                    <a:lumMod val="65000"/>
+                    <a:lumOff val="35000"/>
+                  </a:schemeClr>
+                </a:solidFill>
+              </a:rPr>
               <a:t>Seu</a:t>
             </a:r>
             <a:r>
-              <a:rPr lang="en-US" b="1" dirty="0"/>
+              <a:rPr lang="en-US" b="1" dirty="0">
+                <a:solidFill>
+                  <a:schemeClr val="tx1">
+                    <a:lumMod val="65000"/>
+                    <a:lumOff val="35000"/>
+                  </a:schemeClr>
+                </a:solidFill>
+              </a:rPr>
               <a:t> </a:t>
             </a:r>
             <a:r>
-              <a:rPr lang="en-US" b="1" dirty="0" err="1"/>
+              <a:rPr lang="en-US" b="1" dirty="0" err="1">
+                <a:solidFill>
+                  <a:schemeClr val="tx1">
+                    <a:lumMod val="65000"/>
+                    <a:lumOff val="35000"/>
+                  </a:schemeClr>
+                </a:solidFill>
+              </a:rPr>
               <a:t>prontuário</a:t>
             </a:r>
             <a:r>
-              <a:rPr lang="en-US" b="1" dirty="0"/>
+              <a:rPr lang="en-US" b="1" dirty="0">
+                <a:solidFill>
+                  <a:schemeClr val="tx1">
+                    <a:lumMod val="65000"/>
+                    <a:lumOff val="35000"/>
+                  </a:schemeClr>
+                </a:solidFill>
+              </a:rPr>
               <a:t> </a:t>
             </a:r>
             <a:r>
-              <a:rPr lang="en-US" b="1" dirty="0" err="1"/>
+              <a:rPr lang="en-US" b="1" dirty="0" err="1">
+                <a:solidFill>
+                  <a:schemeClr val="tx1">
+                    <a:lumMod val="65000"/>
+                    <a:lumOff val="35000"/>
+                  </a:schemeClr>
+                </a:solidFill>
+              </a:rPr>
               <a:t>eletrônico</a:t>
             </a:r>
-            <a:endParaRPr lang="en-US" dirty="0"/>
-          </a:p>
-          <a:p>
-            <a:r>
-              <a:rPr lang="en-US" dirty="0" err="1"/>
+            <a:endParaRPr lang="en-US" dirty="0">
+              <a:solidFill>
+                <a:schemeClr val="tx1">
+                  <a:lumMod val="65000"/>
+                  <a:lumOff val="35000"/>
+                </a:schemeClr>
+              </a:solidFill>
+            </a:endParaRPr>
+          </a:p>
+          <a:p>
+            <a:r>
+              <a:rPr lang="en-US" dirty="0" err="1">
+                <a:solidFill>
+                  <a:schemeClr val="tx1">
+                    <a:lumMod val="65000"/>
+                    <a:lumOff val="35000"/>
+                  </a:schemeClr>
+                </a:solidFill>
+              </a:rPr>
               <a:t>Acesso</a:t>
             </a:r>
             <a:r>
-              <a:rPr lang="en-US" dirty="0"/>
+              <a:rPr lang="en-US" dirty="0">
+                <a:solidFill>
+                  <a:schemeClr val="tx1">
+                    <a:lumMod val="65000"/>
+                    <a:lumOff val="35000"/>
+                  </a:schemeClr>
+                </a:solidFill>
+              </a:rPr>
               <a:t> a </a:t>
             </a:r>
             <a:r>
-              <a:rPr lang="en-US" dirty="0" err="1"/>
+              <a:rPr lang="en-US" dirty="0" err="1">
+                <a:solidFill>
+                  <a:schemeClr val="tx1">
+                    <a:lumMod val="65000"/>
+                    <a:lumOff val="35000"/>
+                  </a:schemeClr>
+                </a:solidFill>
+              </a:rPr>
               <a:t>consultas</a:t>
             </a:r>
-            <a:endParaRPr lang="en-US" dirty="0"/>
+            <a:endParaRPr lang="en-US" dirty="0">
+              <a:solidFill>
+                <a:schemeClr val="tx1">
+                  <a:lumMod val="65000"/>
+                  <a:lumOff val="35000"/>
+                </a:schemeClr>
+              </a:solidFill>
+            </a:endParaRPr>
           </a:p>
           <a:p>
             <a:pPr lvl="1"/>
             <a:r>
-              <a:rPr lang="en-US" dirty="0" err="1"/>
+              <a:rPr lang="en-US" dirty="0" err="1">
+                <a:solidFill>
+                  <a:schemeClr val="tx1">
+                    <a:lumMod val="65000"/>
+                    <a:lumOff val="35000"/>
+                  </a:schemeClr>
+                </a:solidFill>
+              </a:rPr>
               <a:t>Consultas</a:t>
             </a:r>
             <a:r>
-              <a:rPr lang="en-US" dirty="0"/>
+              <a:rPr lang="en-US" dirty="0">
+                <a:solidFill>
+                  <a:schemeClr val="tx1">
+                    <a:lumMod val="65000"/>
+                    <a:lumOff val="35000"/>
+                  </a:schemeClr>
+                </a:solidFill>
+              </a:rPr>
               <a:t> </a:t>
             </a:r>
             <a:r>
-              <a:rPr lang="en-US" dirty="0" err="1"/>
+              <a:rPr lang="en-US" dirty="0" err="1">
+                <a:solidFill>
+                  <a:schemeClr val="tx1">
+                    <a:lumMod val="65000"/>
+                    <a:lumOff val="35000"/>
+                  </a:schemeClr>
+                </a:solidFill>
+              </a:rPr>
               <a:t>realizadas</a:t>
             </a:r>
-            <a:endParaRPr lang="en-US" dirty="0"/>
+            <a:endParaRPr lang="en-US" dirty="0">
+              <a:solidFill>
+                <a:schemeClr val="tx1">
+                  <a:lumMod val="65000"/>
+                  <a:lumOff val="35000"/>
+                </a:schemeClr>
+              </a:solidFill>
+            </a:endParaRPr>
           </a:p>
           <a:p>
             <a:pPr lvl="1"/>
             <a:r>
-              <a:rPr lang="en-US" dirty="0" err="1"/>
+              <a:rPr lang="en-US" dirty="0" err="1">
+                <a:solidFill>
+                  <a:schemeClr val="tx1">
+                    <a:lumMod val="65000"/>
+                    <a:lumOff val="35000"/>
+                  </a:schemeClr>
+                </a:solidFill>
+              </a:rPr>
               <a:t>Consultas</a:t>
             </a:r>
             <a:r>
-              <a:rPr lang="en-US" dirty="0"/>
+              <a:rPr lang="en-US" dirty="0">
+                <a:solidFill>
+                  <a:schemeClr val="tx1">
+                    <a:lumMod val="65000"/>
+                    <a:lumOff val="35000"/>
+                  </a:schemeClr>
+                </a:solidFill>
+              </a:rPr>
               <a:t> </a:t>
             </a:r>
             <a:r>
-              <a:rPr lang="en-US" dirty="0" err="1"/>
+              <a:rPr lang="en-US" dirty="0" err="1">
+                <a:solidFill>
+                  <a:schemeClr val="tx1">
+                    <a:lumMod val="65000"/>
+                    <a:lumOff val="35000"/>
+                  </a:schemeClr>
+                </a:solidFill>
+              </a:rPr>
               <a:t>futuras</a:t>
             </a:r>
-            <a:endParaRPr lang="en-US" dirty="0"/>
-          </a:p>
-          <a:p>
-            <a:r>
-              <a:rPr lang="en-US" dirty="0" err="1"/>
+            <a:endParaRPr lang="en-US" dirty="0">
+              <a:solidFill>
+                <a:schemeClr val="tx1">
+                  <a:lumMod val="65000"/>
+                  <a:lumOff val="35000"/>
+                </a:schemeClr>
+              </a:solidFill>
+            </a:endParaRPr>
+          </a:p>
+          <a:p>
+            <a:r>
+              <a:rPr lang="en-US" dirty="0" err="1">
+                <a:solidFill>
+                  <a:schemeClr val="tx1">
+                    <a:lumMod val="65000"/>
+                    <a:lumOff val="35000"/>
+                  </a:schemeClr>
+                </a:solidFill>
+              </a:rPr>
               <a:t>Procuramos</a:t>
             </a:r>
             <a:r>
-              <a:rPr lang="en-US" dirty="0"/>
+              <a:rPr lang="en-US" dirty="0">
+                <a:solidFill>
+                  <a:schemeClr val="tx1">
+                    <a:lumMod val="65000"/>
+                    <a:lumOff val="35000"/>
+                  </a:schemeClr>
+                </a:solidFill>
+              </a:rPr>
               <a:t> </a:t>
             </a:r>
             <a:r>
-              <a:rPr lang="en-US" dirty="0" err="1"/>
+              <a:rPr lang="en-US" dirty="0" err="1">
+                <a:solidFill>
+                  <a:schemeClr val="tx1">
+                    <a:lumMod val="65000"/>
+                    <a:lumOff val="35000"/>
+                  </a:schemeClr>
+                </a:solidFill>
+              </a:rPr>
               <a:t>alguma</a:t>
             </a:r>
             <a:r>
-              <a:rPr lang="en-US" dirty="0"/>
+              <a:rPr lang="en-US" dirty="0">
+                <a:solidFill>
+                  <a:schemeClr val="tx1">
+                    <a:lumMod val="65000"/>
+                    <a:lumOff val="35000"/>
+                  </a:schemeClr>
+                </a:solidFill>
+              </a:rPr>
               <a:t> </a:t>
             </a:r>
             <a:r>
-              <a:rPr lang="en-US" dirty="0" err="1"/>
+              <a:rPr lang="en-US" dirty="0" err="1">
+                <a:solidFill>
+                  <a:schemeClr val="tx1">
+                    <a:lumMod val="65000"/>
+                    <a:lumOff val="35000"/>
+                  </a:schemeClr>
+                </a:solidFill>
+              </a:rPr>
               <a:t>solução</a:t>
             </a:r>
             <a:r>
-              <a:rPr lang="en-US" dirty="0"/>
+              <a:rPr lang="en-US" dirty="0">
+                <a:solidFill>
+                  <a:schemeClr val="tx1">
+                    <a:lumMod val="65000"/>
+                    <a:lumOff val="35000"/>
+                  </a:schemeClr>
+                </a:solidFill>
+              </a:rPr>
               <a:t> que </a:t>
             </a:r>
             <a:r>
-              <a:rPr lang="en-US" dirty="0" err="1"/>
+              <a:rPr lang="en-US" dirty="0" err="1">
+                <a:solidFill>
+                  <a:schemeClr val="tx1">
+                    <a:lumMod val="65000"/>
+                    <a:lumOff val="35000"/>
+                  </a:schemeClr>
+                </a:solidFill>
+              </a:rPr>
               <a:t>atendesse</a:t>
             </a:r>
             <a:r>
-              <a:rPr lang="en-US" dirty="0"/>
+              <a:rPr lang="en-US" dirty="0">
+                <a:solidFill>
+                  <a:schemeClr val="tx1">
+                    <a:lumMod val="65000"/>
+                    <a:lumOff val="35000"/>
+                  </a:schemeClr>
+                </a:solidFill>
+              </a:rPr>
               <a:t> a </a:t>
             </a:r>
             <a:r>
-              <a:rPr lang="en-US" dirty="0" err="1"/>
+              <a:rPr lang="en-US" dirty="0" err="1">
+                <a:solidFill>
+                  <a:schemeClr val="tx1">
+                    <a:lumMod val="65000"/>
+                    <a:lumOff val="35000"/>
+                  </a:schemeClr>
+                </a:solidFill>
+              </a:rPr>
               <a:t>área</a:t>
             </a:r>
             <a:r>
-              <a:rPr lang="en-US" dirty="0"/>
+              <a:rPr lang="en-US" dirty="0">
+                <a:solidFill>
+                  <a:schemeClr val="tx1">
+                    <a:lumMod val="65000"/>
+                    <a:lumOff val="35000"/>
+                  </a:schemeClr>
+                </a:solidFill>
+              </a:rPr>
               <a:t> da </a:t>
             </a:r>
             <a:r>
-              <a:rPr lang="en-US" dirty="0" err="1"/>
+              <a:rPr lang="en-US" dirty="0" err="1">
+                <a:solidFill>
+                  <a:schemeClr val="tx1">
+                    <a:lumMod val="65000"/>
+                    <a:lumOff val="35000"/>
+                  </a:schemeClr>
+                </a:solidFill>
+              </a:rPr>
               <a:t>saúde</a:t>
             </a:r>
             <a:r>
-              <a:rPr lang="en-US" dirty="0"/>
+              <a:rPr lang="en-US" dirty="0">
+                <a:solidFill>
+                  <a:schemeClr val="tx1">
+                    <a:lumMod val="65000"/>
+                    <a:lumOff val="35000"/>
+                  </a:schemeClr>
+                </a:solidFill>
+              </a:rPr>
               <a:t> e </a:t>
             </a:r>
             <a:r>
-              <a:rPr lang="en-US" dirty="0" err="1"/>
+              <a:rPr lang="en-US" dirty="0" err="1">
+                <a:solidFill>
+                  <a:schemeClr val="tx1">
+                    <a:lumMod val="65000"/>
+                    <a:lumOff val="35000"/>
+                  </a:schemeClr>
+                </a:solidFill>
+              </a:rPr>
               <a:t>também</a:t>
             </a:r>
             <a:r>
-              <a:rPr lang="en-US" dirty="0"/>
+              <a:rPr lang="en-US" dirty="0">
+                <a:solidFill>
+                  <a:schemeClr val="tx1">
+                    <a:lumMod val="65000"/>
+                    <a:lumOff val="35000"/>
+                  </a:schemeClr>
+                </a:solidFill>
+              </a:rPr>
               <a:t> </a:t>
             </a:r>
             <a:r>
-              <a:rPr lang="en-US" dirty="0" err="1"/>
+              <a:rPr lang="en-US" dirty="0" err="1">
+                <a:solidFill>
+                  <a:schemeClr val="tx1">
+                    <a:lumMod val="65000"/>
+                    <a:lumOff val="35000"/>
+                  </a:schemeClr>
+                </a:solidFill>
+              </a:rPr>
               <a:t>baseado</a:t>
             </a:r>
             <a:r>
-              <a:rPr lang="en-US" dirty="0"/>
+              <a:rPr lang="en-US" dirty="0">
+                <a:solidFill>
+                  <a:schemeClr val="tx1">
+                    <a:lumMod val="65000"/>
+                    <a:lumOff val="35000"/>
+                  </a:schemeClr>
+                </a:solidFill>
+              </a:rPr>
               <a:t> no </a:t>
             </a:r>
             <a:r>
-              <a:rPr lang="en-US" dirty="0" err="1"/>
+              <a:rPr lang="en-US" dirty="0" err="1">
+                <a:solidFill>
+                  <a:schemeClr val="tx1">
+                    <a:lumMod val="65000"/>
+                    <a:lumOff val="35000"/>
+                  </a:schemeClr>
+                </a:solidFill>
+              </a:rPr>
               <a:t>desafio</a:t>
             </a:r>
             <a:r>
-              <a:rPr lang="en-US" dirty="0"/>
+              <a:rPr lang="en-US" dirty="0">
+                <a:solidFill>
+                  <a:schemeClr val="tx1">
+                    <a:lumMod val="65000"/>
+                    <a:lumOff val="35000"/>
+                  </a:schemeClr>
+                </a:solidFill>
+              </a:rPr>
               <a:t> </a:t>
             </a:r>
             <a:r>
-              <a:rPr lang="en-US" dirty="0" err="1"/>
+              <a:rPr lang="en-US" dirty="0" err="1">
+                <a:solidFill>
+                  <a:schemeClr val="tx1">
+                    <a:lumMod val="65000"/>
+                    <a:lumOff val="35000"/>
+                  </a:schemeClr>
+                </a:solidFill>
+              </a:rPr>
               <a:t>encontrado</a:t>
             </a:r>
             <a:r>
-              <a:rPr lang="en-US" dirty="0"/>
+              <a:rPr lang="en-US" dirty="0">
+                <a:solidFill>
+                  <a:schemeClr val="tx1">
+                    <a:lumMod val="65000"/>
+                    <a:lumOff val="35000"/>
+                  </a:schemeClr>
+                </a:solidFill>
+              </a:rPr>
               <a:t> </a:t>
             </a:r>
             <a:r>
-              <a:rPr lang="en-US" dirty="0" err="1"/>
+              <a:rPr lang="en-US" dirty="0" err="1">
+                <a:solidFill>
+                  <a:schemeClr val="tx1">
+                    <a:lumMod val="65000"/>
+                    <a:lumOff val="35000"/>
+                  </a:schemeClr>
+                </a:solidFill>
+              </a:rPr>
               <a:t>pelos</a:t>
             </a:r>
             <a:r>
-              <a:rPr lang="en-US" dirty="0"/>
+              <a:rPr lang="en-US" dirty="0">
+                <a:solidFill>
+                  <a:schemeClr val="tx1">
+                    <a:lumMod val="65000"/>
+                    <a:lumOff val="35000"/>
+                  </a:schemeClr>
+                </a:solidFill>
+              </a:rPr>
               <a:t> </a:t>
             </a:r>
             <a:r>
-              <a:rPr lang="en-US" dirty="0" err="1"/>
+              <a:rPr lang="en-US" dirty="0" err="1">
+                <a:solidFill>
+                  <a:schemeClr val="tx1">
+                    <a:lumMod val="65000"/>
+                    <a:lumOff val="35000"/>
+                  </a:schemeClr>
+                </a:solidFill>
+              </a:rPr>
               <a:t>estudantes</a:t>
             </a:r>
             <a:r>
-              <a:rPr lang="en-US" dirty="0"/>
+              <a:rPr lang="en-US" dirty="0">
+                <a:solidFill>
+                  <a:schemeClr val="tx1">
+                    <a:lumMod val="65000"/>
+                    <a:lumOff val="35000"/>
+                  </a:schemeClr>
+                </a:solidFill>
+              </a:rPr>
               <a:t> </a:t>
             </a:r>
             <a:r>
-              <a:rPr lang="en-US" dirty="0" err="1"/>
+              <a:rPr lang="en-US" dirty="0" err="1">
+                <a:solidFill>
+                  <a:schemeClr val="tx1">
+                    <a:lumMod val="65000"/>
+                    <a:lumOff val="35000"/>
+                  </a:schemeClr>
+                </a:solidFill>
+              </a:rPr>
               <a:t>como</a:t>
             </a:r>
             <a:r>
-              <a:rPr lang="en-US" dirty="0"/>
+              <a:rPr lang="en-US" dirty="0">
+                <a:solidFill>
+                  <a:schemeClr val="tx1">
+                    <a:lumMod val="65000"/>
+                    <a:lumOff val="35000"/>
+                  </a:schemeClr>
+                </a:solidFill>
+              </a:rPr>
               <a:t> </a:t>
             </a:r>
             <a:r>
-              <a:rPr lang="en-US" dirty="0" err="1"/>
+              <a:rPr lang="en-US" dirty="0" err="1">
+                <a:solidFill>
+                  <a:schemeClr val="tx1">
+                    <a:lumMod val="65000"/>
+                    <a:lumOff val="35000"/>
+                  </a:schemeClr>
+                </a:solidFill>
+              </a:rPr>
               <a:t>pacientes</a:t>
             </a:r>
             <a:r>
-              <a:rPr lang="en-US" dirty="0"/>
+              <a:rPr lang="en-US" dirty="0">
+                <a:solidFill>
+                  <a:schemeClr val="tx1">
+                    <a:lumMod val="65000"/>
+                    <a:lumOff val="35000"/>
+                  </a:schemeClr>
+                </a:solidFill>
+              </a:rPr>
               <a:t> que </a:t>
             </a:r>
             <a:r>
-              <a:rPr lang="en-US" dirty="0" err="1"/>
+              <a:rPr lang="en-US" dirty="0" err="1">
+                <a:solidFill>
+                  <a:schemeClr val="tx1">
+                    <a:lumMod val="65000"/>
+                    <a:lumOff val="35000"/>
+                  </a:schemeClr>
+                </a:solidFill>
+              </a:rPr>
               <a:t>não</a:t>
             </a:r>
             <a:r>
-              <a:rPr lang="en-US" dirty="0"/>
+              <a:rPr lang="en-US" dirty="0">
+                <a:solidFill>
+                  <a:schemeClr val="tx1">
+                    <a:lumMod val="65000"/>
+                    <a:lumOff val="35000"/>
+                  </a:schemeClr>
+                </a:solidFill>
+              </a:rPr>
               <a:t> </a:t>
             </a:r>
             <a:r>
-              <a:rPr lang="en-US" dirty="0" err="1"/>
+              <a:rPr lang="en-US" dirty="0" err="1">
+                <a:solidFill>
+                  <a:schemeClr val="tx1">
+                    <a:lumMod val="65000"/>
+                    <a:lumOff val="35000"/>
+                  </a:schemeClr>
+                </a:solidFill>
+              </a:rPr>
               <a:t>tem</a:t>
             </a:r>
             <a:r>
-              <a:rPr lang="en-US" dirty="0"/>
+              <a:rPr lang="en-US" dirty="0">
+                <a:solidFill>
+                  <a:schemeClr val="tx1">
+                    <a:lumMod val="65000"/>
+                    <a:lumOff val="35000"/>
+                  </a:schemeClr>
+                </a:solidFill>
+              </a:rPr>
               <a:t> </a:t>
             </a:r>
             <a:r>
-              <a:rPr lang="en-US" dirty="0" err="1"/>
+              <a:rPr lang="en-US" dirty="0" err="1">
+                <a:solidFill>
+                  <a:schemeClr val="tx1">
+                    <a:lumMod val="65000"/>
+                    <a:lumOff val="35000"/>
+                  </a:schemeClr>
+                </a:solidFill>
+              </a:rPr>
               <a:t>acesso</a:t>
             </a:r>
             <a:r>
-              <a:rPr lang="en-US" dirty="0"/>
+              <a:rPr lang="en-US" dirty="0">
+                <a:solidFill>
+                  <a:schemeClr val="tx1">
+                    <a:lumMod val="65000"/>
+                    <a:lumOff val="35000"/>
+                  </a:schemeClr>
+                </a:solidFill>
+              </a:rPr>
               <a:t> </a:t>
             </a:r>
             <a:r>
-              <a:rPr lang="en-US" dirty="0" err="1"/>
+              <a:rPr lang="en-US" dirty="0" err="1">
+                <a:solidFill>
+                  <a:schemeClr val="tx1">
+                    <a:lumMod val="65000"/>
+                    <a:lumOff val="35000"/>
+                  </a:schemeClr>
+                </a:solidFill>
+              </a:rPr>
               <a:t>fácil</a:t>
             </a:r>
             <a:r>
-              <a:rPr lang="en-US" dirty="0"/>
+              <a:rPr lang="en-US" dirty="0">
+                <a:solidFill>
+                  <a:schemeClr val="tx1">
+                    <a:lumMod val="65000"/>
+                    <a:lumOff val="35000"/>
+                  </a:schemeClr>
+                </a:solidFill>
+              </a:rPr>
               <a:t> </a:t>
             </a:r>
             <a:r>
-              <a:rPr lang="en-US" dirty="0" err="1"/>
+              <a:rPr lang="en-US" dirty="0" err="1">
+                <a:solidFill>
+                  <a:schemeClr val="tx1">
+                    <a:lumMod val="65000"/>
+                    <a:lumOff val="35000"/>
+                  </a:schemeClr>
+                </a:solidFill>
+              </a:rPr>
               <a:t>ao</a:t>
             </a:r>
             <a:r>
-              <a:rPr lang="en-US" dirty="0"/>
+              <a:rPr lang="en-US" dirty="0">
+                <a:solidFill>
+                  <a:schemeClr val="tx1">
+                    <a:lumMod val="65000"/>
+                    <a:lumOff val="35000"/>
+                  </a:schemeClr>
+                </a:solidFill>
+              </a:rPr>
               <a:t> </a:t>
             </a:r>
             <a:r>
-              <a:rPr lang="en-US" dirty="0" err="1"/>
+              <a:rPr lang="en-US" dirty="0" err="1">
+                <a:solidFill>
+                  <a:schemeClr val="tx1">
+                    <a:lumMod val="65000"/>
+                    <a:lumOff val="35000"/>
+                  </a:schemeClr>
+                </a:solidFill>
+              </a:rPr>
               <a:t>prontuário</a:t>
             </a:r>
             <a:r>
-              <a:rPr lang="en-US" dirty="0"/>
+              <a:rPr lang="en-US" dirty="0">
+                <a:solidFill>
+                  <a:schemeClr val="tx1">
+                    <a:lumMod val="65000"/>
+                    <a:lumOff val="35000"/>
+                  </a:schemeClr>
+                </a:solidFill>
+              </a:rPr>
               <a:t> do </a:t>
             </a:r>
             <a:r>
-              <a:rPr lang="en-US" dirty="0" err="1"/>
+              <a:rPr lang="en-US" dirty="0" err="1">
+                <a:solidFill>
+                  <a:schemeClr val="tx1">
+                    <a:lumMod val="65000"/>
+                    <a:lumOff val="35000"/>
+                  </a:schemeClr>
+                </a:solidFill>
+              </a:rPr>
               <a:t>médico</a:t>
             </a:r>
-            <a:endParaRPr lang="en-US" dirty="0"/>
+            <a:endParaRPr lang="en-US" dirty="0">
+              <a:solidFill>
+                <a:schemeClr val="tx1">
+                  <a:lumMod val="65000"/>
+                  <a:lumOff val="35000"/>
+                </a:schemeClr>
+              </a:solidFill>
+            </a:endParaRPr>
           </a:p>
           <a:p>
             <a:endParaRPr lang="en-US" dirty="0"/>
@@ -3954,270 +4424,660 @@
           <a:lstStyle/>
           <a:p>
             <a:r>
-              <a:rPr lang="en-US" b="1" dirty="0" err="1"/>
+              <a:rPr lang="en-US" b="1" dirty="0" err="1">
+                <a:solidFill>
+                  <a:schemeClr val="bg2">
+                    <a:lumMod val="50000"/>
+                  </a:schemeClr>
+                </a:solidFill>
+              </a:rPr>
               <a:t>Desafios</a:t>
             </a:r>
             <a:r>
-              <a:rPr lang="en-US" b="1" dirty="0"/>
+              <a:rPr lang="en-US" b="1" dirty="0">
+                <a:solidFill>
+                  <a:schemeClr val="bg2">
+                    <a:lumMod val="50000"/>
+                  </a:schemeClr>
+                </a:solidFill>
+              </a:rPr>
               <a:t> </a:t>
             </a:r>
             <a:r>
-              <a:rPr lang="en-US" b="1" dirty="0" err="1"/>
+              <a:rPr lang="en-US" b="1" dirty="0" err="1">
+                <a:solidFill>
+                  <a:schemeClr val="bg2">
+                    <a:lumMod val="50000"/>
+                  </a:schemeClr>
+                </a:solidFill>
+              </a:rPr>
               <a:t>técnicos</a:t>
             </a:r>
-            <a:endParaRPr lang="en-US" dirty="0"/>
-          </a:p>
-          <a:p>
-            <a:r>
-              <a:rPr lang="en-US" dirty="0" err="1"/>
+            <a:endParaRPr lang="en-US" dirty="0">
+              <a:solidFill>
+                <a:schemeClr val="bg2">
+                  <a:lumMod val="50000"/>
+                </a:schemeClr>
+              </a:solidFill>
+            </a:endParaRPr>
+          </a:p>
+          <a:p>
+            <a:r>
+              <a:rPr lang="en-US" dirty="0" err="1">
+                <a:solidFill>
+                  <a:schemeClr val="bg2">
+                    <a:lumMod val="50000"/>
+                  </a:schemeClr>
+                </a:solidFill>
+              </a:rPr>
               <a:t>Trabalhar</a:t>
             </a:r>
             <a:r>
-              <a:rPr lang="en-US" dirty="0"/>
+              <a:rPr lang="en-US" dirty="0">
+                <a:solidFill>
+                  <a:schemeClr val="bg2">
+                    <a:lumMod val="50000"/>
+                  </a:schemeClr>
+                </a:solidFill>
+              </a:rPr>
               <a:t> </a:t>
             </a:r>
             <a:r>
-              <a:rPr lang="en-US" dirty="0" err="1"/>
+              <a:rPr lang="en-US" dirty="0" err="1">
+                <a:solidFill>
+                  <a:schemeClr val="bg2">
+                    <a:lumMod val="50000"/>
+                  </a:schemeClr>
+                </a:solidFill>
+              </a:rPr>
               <a:t>em</a:t>
             </a:r>
             <a:r>
-              <a:rPr lang="en-US" dirty="0"/>
+              <a:rPr lang="en-US" dirty="0">
+                <a:solidFill>
+                  <a:schemeClr val="bg2">
+                    <a:lumMod val="50000"/>
+                  </a:schemeClr>
+                </a:solidFill>
+              </a:rPr>
               <a:t> </a:t>
             </a:r>
             <a:r>
-              <a:rPr lang="en-US" dirty="0" err="1"/>
+              <a:rPr lang="en-US" dirty="0" err="1">
+                <a:solidFill>
+                  <a:schemeClr val="bg2">
+                    <a:lumMod val="50000"/>
+                  </a:schemeClr>
+                </a:solidFill>
+              </a:rPr>
               <a:t>dupla</a:t>
             </a:r>
             <a:r>
-              <a:rPr lang="en-US" dirty="0"/>
+              <a:rPr lang="en-US" dirty="0">
+                <a:solidFill>
+                  <a:schemeClr val="bg2">
+                    <a:lumMod val="50000"/>
+                  </a:schemeClr>
+                </a:solidFill>
+              </a:rPr>
               <a:t>!</a:t>
             </a:r>
           </a:p>
           <a:p>
             <a:pPr lvl="1"/>
             <a:r>
-              <a:rPr lang="en-US" dirty="0" err="1"/>
+              <a:rPr lang="en-US" dirty="0" err="1">
+                <a:solidFill>
+                  <a:schemeClr val="bg2">
+                    <a:lumMod val="50000"/>
+                  </a:schemeClr>
+                </a:solidFill>
+              </a:rPr>
               <a:t>Definir</a:t>
             </a:r>
             <a:r>
-              <a:rPr lang="en-US" dirty="0"/>
+              <a:rPr lang="en-US" dirty="0">
+                <a:solidFill>
+                  <a:schemeClr val="bg2">
+                    <a:lumMod val="50000"/>
+                  </a:schemeClr>
+                </a:solidFill>
+              </a:rPr>
               <a:t> </a:t>
             </a:r>
             <a:r>
-              <a:rPr lang="en-US" dirty="0" err="1"/>
+              <a:rPr lang="en-US" dirty="0" err="1">
+                <a:solidFill>
+                  <a:schemeClr val="bg2">
+                    <a:lumMod val="50000"/>
+                  </a:schemeClr>
+                </a:solidFill>
+              </a:rPr>
               <a:t>escopo</a:t>
             </a:r>
             <a:r>
-              <a:rPr lang="en-US" dirty="0"/>
+              <a:rPr lang="en-US" dirty="0">
+                <a:solidFill>
+                  <a:schemeClr val="bg2">
+                    <a:lumMod val="50000"/>
+                  </a:schemeClr>
+                </a:solidFill>
+              </a:rPr>
               <a:t> de </a:t>
             </a:r>
             <a:r>
-              <a:rPr lang="en-US" dirty="0" err="1"/>
+              <a:rPr lang="en-US" dirty="0" err="1">
+                <a:solidFill>
+                  <a:schemeClr val="bg2">
+                    <a:lumMod val="50000"/>
+                  </a:schemeClr>
+                </a:solidFill>
+              </a:rPr>
               <a:t>cada</a:t>
             </a:r>
             <a:r>
-              <a:rPr lang="en-US" dirty="0"/>
+              <a:rPr lang="en-US" dirty="0">
+                <a:solidFill>
+                  <a:schemeClr val="bg2">
+                    <a:lumMod val="50000"/>
+                  </a:schemeClr>
+                </a:solidFill>
+              </a:rPr>
               <a:t> </a:t>
             </a:r>
             <a:r>
-              <a:rPr lang="en-US" dirty="0" err="1"/>
+              <a:rPr lang="en-US" dirty="0" err="1">
+                <a:solidFill>
+                  <a:schemeClr val="bg2">
+                    <a:lumMod val="50000"/>
+                  </a:schemeClr>
+                </a:solidFill>
+              </a:rPr>
               <a:t>pessoa</a:t>
             </a:r>
-            <a:endParaRPr lang="en-US" dirty="0"/>
+            <a:endParaRPr lang="en-US" dirty="0">
+              <a:solidFill>
+                <a:schemeClr val="bg2">
+                  <a:lumMod val="50000"/>
+                </a:schemeClr>
+              </a:solidFill>
+            </a:endParaRPr>
           </a:p>
           <a:p>
             <a:pPr lvl="1"/>
             <a:r>
-              <a:rPr lang="en-US" dirty="0"/>
+              <a:rPr lang="en-US" dirty="0">
+                <a:solidFill>
+                  <a:schemeClr val="bg2">
+                    <a:lumMod val="50000"/>
+                  </a:schemeClr>
+                </a:solidFill>
+              </a:rPr>
               <a:t>Resolver </a:t>
             </a:r>
             <a:r>
-              <a:rPr lang="en-US" dirty="0" err="1"/>
+              <a:rPr lang="en-US" dirty="0" err="1">
+                <a:solidFill>
+                  <a:schemeClr val="bg2">
+                    <a:lumMod val="50000"/>
+                  </a:schemeClr>
+                </a:solidFill>
+              </a:rPr>
               <a:t>conflitos</a:t>
             </a:r>
             <a:r>
-              <a:rPr lang="en-US" dirty="0"/>
+              <a:rPr lang="en-US" dirty="0">
+                <a:solidFill>
+                  <a:schemeClr val="bg2">
+                    <a:lumMod val="50000"/>
+                  </a:schemeClr>
+                </a:solidFill>
+              </a:rPr>
               <a:t> de Código</a:t>
             </a:r>
           </a:p>
           <a:p>
             <a:r>
-              <a:rPr lang="en-US" dirty="0"/>
+              <a:rPr lang="en-US" dirty="0">
+                <a:solidFill>
+                  <a:schemeClr val="bg2">
+                    <a:lumMod val="50000"/>
+                  </a:schemeClr>
+                </a:solidFill>
+              </a:rPr>
               <a:t>Tempo</a:t>
             </a:r>
           </a:p>
           <a:p>
             <a:pPr lvl="1"/>
             <a:r>
-              <a:rPr lang="en-US" dirty="0"/>
+              <a:rPr lang="en-US" dirty="0">
+                <a:solidFill>
+                  <a:schemeClr val="bg2">
+                    <a:lumMod val="50000"/>
+                  </a:schemeClr>
+                </a:solidFill>
+              </a:rPr>
               <a:t>Na </a:t>
             </a:r>
             <a:r>
-              <a:rPr lang="en-US" dirty="0" err="1"/>
+              <a:rPr lang="en-US" dirty="0" err="1">
+                <a:solidFill>
+                  <a:schemeClr val="bg2">
+                    <a:lumMod val="50000"/>
+                  </a:schemeClr>
+                </a:solidFill>
+              </a:rPr>
               <a:t>fase</a:t>
             </a:r>
             <a:r>
-              <a:rPr lang="en-US" dirty="0"/>
+              <a:rPr lang="en-US" dirty="0">
+                <a:solidFill>
+                  <a:schemeClr val="bg2">
+                    <a:lumMod val="50000"/>
+                  </a:schemeClr>
+                </a:solidFill>
+              </a:rPr>
               <a:t> </a:t>
             </a:r>
             <a:r>
-              <a:rPr lang="en-US" dirty="0" err="1"/>
+              <a:rPr lang="en-US" dirty="0" err="1">
+                <a:solidFill>
+                  <a:schemeClr val="bg2">
+                    <a:lumMod val="50000"/>
+                  </a:schemeClr>
+                </a:solidFill>
+              </a:rPr>
               <a:t>inicial</a:t>
             </a:r>
             <a:r>
-              <a:rPr lang="en-US" dirty="0"/>
+              <a:rPr lang="en-US" dirty="0">
+                <a:solidFill>
+                  <a:schemeClr val="bg2">
+                    <a:lumMod val="50000"/>
+                  </a:schemeClr>
+                </a:solidFill>
+              </a:rPr>
               <a:t> do </a:t>
             </a:r>
             <a:r>
-              <a:rPr lang="en-US" dirty="0" err="1"/>
+              <a:rPr lang="en-US" dirty="0" err="1">
+                <a:solidFill>
+                  <a:schemeClr val="bg2">
+                    <a:lumMod val="50000"/>
+                  </a:schemeClr>
+                </a:solidFill>
+              </a:rPr>
               <a:t>projeto</a:t>
             </a:r>
             <a:r>
-              <a:rPr lang="en-US" dirty="0"/>
+              <a:rPr lang="en-US" dirty="0">
+                <a:solidFill>
+                  <a:schemeClr val="bg2">
+                    <a:lumMod val="50000"/>
+                  </a:schemeClr>
+                </a:solidFill>
+              </a:rPr>
               <a:t> </a:t>
             </a:r>
             <a:r>
-              <a:rPr lang="en-US" dirty="0" err="1"/>
+              <a:rPr lang="en-US" dirty="0" err="1">
+                <a:solidFill>
+                  <a:schemeClr val="bg2">
+                    <a:lumMod val="50000"/>
+                  </a:schemeClr>
+                </a:solidFill>
+              </a:rPr>
               <a:t>tivemos</a:t>
             </a:r>
             <a:r>
-              <a:rPr lang="en-US" dirty="0"/>
+              <a:rPr lang="en-US" dirty="0">
+                <a:solidFill>
+                  <a:schemeClr val="bg2">
+                    <a:lumMod val="50000"/>
+                  </a:schemeClr>
+                </a:solidFill>
+              </a:rPr>
               <a:t> </a:t>
             </a:r>
             <a:r>
-              <a:rPr lang="en-US" dirty="0" err="1"/>
+              <a:rPr lang="en-US" dirty="0" err="1">
+                <a:solidFill>
+                  <a:schemeClr val="bg2">
+                    <a:lumMod val="50000"/>
+                  </a:schemeClr>
+                </a:solidFill>
+              </a:rPr>
               <a:t>bastante</a:t>
             </a:r>
             <a:r>
-              <a:rPr lang="en-US" dirty="0"/>
+              <a:rPr lang="en-US" dirty="0">
+                <a:solidFill>
+                  <a:schemeClr val="bg2">
+                    <a:lumMod val="50000"/>
+                  </a:schemeClr>
+                </a:solidFill>
+              </a:rPr>
               <a:t> tempo </a:t>
             </a:r>
             <a:r>
-              <a:rPr lang="en-US" dirty="0" err="1"/>
+              <a:rPr lang="en-US" dirty="0" err="1">
+                <a:solidFill>
+                  <a:schemeClr val="bg2">
+                    <a:lumMod val="50000"/>
+                  </a:schemeClr>
+                </a:solidFill>
+              </a:rPr>
               <a:t>apra</a:t>
             </a:r>
             <a:r>
-              <a:rPr lang="en-US" dirty="0"/>
+              <a:rPr lang="en-US" dirty="0">
+                <a:solidFill>
+                  <a:schemeClr val="bg2">
+                    <a:lumMod val="50000"/>
+                  </a:schemeClr>
+                </a:solidFill>
+              </a:rPr>
               <a:t> se </a:t>
             </a:r>
             <a:r>
-              <a:rPr lang="en-US" dirty="0" err="1"/>
+              <a:rPr lang="en-US" dirty="0" err="1">
+                <a:solidFill>
+                  <a:schemeClr val="bg2">
+                    <a:lumMod val="50000"/>
+                  </a:schemeClr>
+                </a:solidFill>
+              </a:rPr>
               <a:t>dedicar</a:t>
             </a:r>
             <a:r>
-              <a:rPr lang="en-US" dirty="0"/>
+              <a:rPr lang="en-US" dirty="0">
+                <a:solidFill>
+                  <a:schemeClr val="bg2">
+                    <a:lumMod val="50000"/>
+                  </a:schemeClr>
+                </a:solidFill>
+              </a:rPr>
               <a:t> e </a:t>
             </a:r>
             <a:r>
-              <a:rPr lang="en-US" dirty="0" err="1"/>
+              <a:rPr lang="en-US" dirty="0" err="1">
+                <a:solidFill>
+                  <a:schemeClr val="bg2">
+                    <a:lumMod val="50000"/>
+                  </a:schemeClr>
+                </a:solidFill>
+              </a:rPr>
               <a:t>planejar</a:t>
             </a:r>
             <a:r>
-              <a:rPr lang="en-US" dirty="0"/>
+              <a:rPr lang="en-US" dirty="0">
+                <a:solidFill>
+                  <a:schemeClr val="bg2">
+                    <a:lumMod val="50000"/>
+                  </a:schemeClr>
+                </a:solidFill>
+              </a:rPr>
               <a:t> </a:t>
             </a:r>
             <a:r>
-              <a:rPr lang="en-US" dirty="0" err="1"/>
+              <a:rPr lang="en-US" dirty="0" err="1">
+                <a:solidFill>
+                  <a:schemeClr val="bg2">
+                    <a:lumMod val="50000"/>
+                  </a:schemeClr>
+                </a:solidFill>
+              </a:rPr>
               <a:t>funções</a:t>
             </a:r>
             <a:r>
-              <a:rPr lang="en-US" dirty="0"/>
+              <a:rPr lang="en-US" dirty="0">
+                <a:solidFill>
+                  <a:schemeClr val="bg2">
+                    <a:lumMod val="50000"/>
+                  </a:schemeClr>
+                </a:solidFill>
+              </a:rPr>
               <a:t> </a:t>
             </a:r>
             <a:r>
-              <a:rPr lang="en-US" dirty="0" err="1"/>
+              <a:rPr lang="en-US" dirty="0" err="1">
+                <a:solidFill>
+                  <a:schemeClr val="bg2">
+                    <a:lumMod val="50000"/>
+                  </a:schemeClr>
+                </a:solidFill>
+              </a:rPr>
               <a:t>futuras</a:t>
             </a:r>
             <a:r>
-              <a:rPr lang="en-US" dirty="0"/>
+              <a:rPr lang="en-US" dirty="0">
+                <a:solidFill>
+                  <a:schemeClr val="bg2">
+                    <a:lumMod val="50000"/>
+                  </a:schemeClr>
+                </a:solidFill>
+              </a:rPr>
               <a:t> </a:t>
             </a:r>
             <a:r>
-              <a:rPr lang="en-US" dirty="0" err="1"/>
+              <a:rPr lang="en-US" dirty="0" err="1">
+                <a:solidFill>
+                  <a:schemeClr val="bg2">
+                    <a:lumMod val="50000"/>
+                  </a:schemeClr>
+                </a:solidFill>
+              </a:rPr>
               <a:t>porém</a:t>
             </a:r>
             <a:r>
-              <a:rPr lang="en-US" dirty="0"/>
+              <a:rPr lang="en-US" dirty="0">
+                <a:solidFill>
+                  <a:schemeClr val="bg2">
+                    <a:lumMod val="50000"/>
+                  </a:schemeClr>
+                </a:solidFill>
+              </a:rPr>
               <a:t> </a:t>
             </a:r>
             <a:r>
-              <a:rPr lang="en-US" dirty="0" err="1"/>
+              <a:rPr lang="en-US" dirty="0" err="1">
+                <a:solidFill>
+                  <a:schemeClr val="bg2">
+                    <a:lumMod val="50000"/>
+                  </a:schemeClr>
+                </a:solidFill>
+              </a:rPr>
               <a:t>na</a:t>
             </a:r>
             <a:r>
-              <a:rPr lang="en-US" dirty="0"/>
+              <a:rPr lang="en-US" dirty="0">
+                <a:solidFill>
+                  <a:schemeClr val="bg2">
+                    <a:lumMod val="50000"/>
+                  </a:schemeClr>
+                </a:solidFill>
+              </a:rPr>
               <a:t> ultima </a:t>
             </a:r>
             <a:r>
-              <a:rPr lang="en-US" dirty="0" err="1"/>
+              <a:rPr lang="en-US" dirty="0" err="1">
+                <a:solidFill>
+                  <a:schemeClr val="bg2">
+                    <a:lumMod val="50000"/>
+                  </a:schemeClr>
+                </a:solidFill>
+              </a:rPr>
               <a:t>semana</a:t>
             </a:r>
             <a:r>
-              <a:rPr lang="en-US" dirty="0"/>
+              <a:rPr lang="en-US" dirty="0">
+                <a:solidFill>
+                  <a:schemeClr val="bg2">
+                    <a:lumMod val="50000"/>
+                  </a:schemeClr>
+                </a:solidFill>
+              </a:rPr>
               <a:t> ambos </a:t>
             </a:r>
             <a:r>
-              <a:rPr lang="en-US" dirty="0" err="1"/>
+              <a:rPr lang="en-US" dirty="0" err="1">
+                <a:solidFill>
+                  <a:schemeClr val="bg2">
+                    <a:lumMod val="50000"/>
+                  </a:schemeClr>
+                </a:solidFill>
+              </a:rPr>
               <a:t>ficaram</a:t>
             </a:r>
             <a:r>
-              <a:rPr lang="en-US" dirty="0"/>
+              <a:rPr lang="en-US" dirty="0">
+                <a:solidFill>
+                  <a:schemeClr val="bg2">
+                    <a:lumMod val="50000"/>
+                  </a:schemeClr>
+                </a:solidFill>
+              </a:rPr>
               <a:t> </a:t>
             </a:r>
             <a:r>
-              <a:rPr lang="en-US" dirty="0" err="1"/>
+              <a:rPr lang="en-US" dirty="0" err="1">
+                <a:solidFill>
+                  <a:schemeClr val="bg2">
+                    <a:lumMod val="50000"/>
+                  </a:schemeClr>
+                </a:solidFill>
+              </a:rPr>
               <a:t>atarefados</a:t>
             </a:r>
             <a:r>
-              <a:rPr lang="en-US" dirty="0"/>
+              <a:rPr lang="en-US" dirty="0">
+                <a:solidFill>
+                  <a:schemeClr val="bg2">
+                    <a:lumMod val="50000"/>
+                  </a:schemeClr>
+                </a:solidFill>
+              </a:rPr>
               <a:t> no </a:t>
             </a:r>
             <a:r>
-              <a:rPr lang="en-US" dirty="0" err="1"/>
+              <a:rPr lang="en-US" dirty="0" err="1">
+                <a:solidFill>
+                  <a:schemeClr val="bg2">
+                    <a:lumMod val="50000"/>
+                  </a:schemeClr>
+                </a:solidFill>
+              </a:rPr>
               <a:t>trabalho</a:t>
             </a:r>
             <a:r>
-              <a:rPr lang="en-US" dirty="0"/>
+              <a:rPr lang="en-US" dirty="0">
+                <a:solidFill>
+                  <a:schemeClr val="bg2">
+                    <a:lumMod val="50000"/>
+                  </a:schemeClr>
+                </a:solidFill>
+              </a:rPr>
               <a:t> e </a:t>
             </a:r>
             <a:r>
-              <a:rPr lang="en-US" dirty="0" err="1"/>
+              <a:rPr lang="en-US" dirty="0" err="1">
+                <a:solidFill>
+                  <a:schemeClr val="bg2">
+                    <a:lumMod val="50000"/>
+                  </a:schemeClr>
+                </a:solidFill>
+              </a:rPr>
               <a:t>isso</a:t>
             </a:r>
             <a:r>
-              <a:rPr lang="en-US" dirty="0"/>
+              <a:rPr lang="en-US" dirty="0">
+                <a:solidFill>
+                  <a:schemeClr val="bg2">
+                    <a:lumMod val="50000"/>
+                  </a:schemeClr>
+                </a:solidFill>
+              </a:rPr>
               <a:t> </a:t>
             </a:r>
             <a:r>
-              <a:rPr lang="en-US" dirty="0" err="1"/>
+              <a:rPr lang="en-US" dirty="0" err="1">
+                <a:solidFill>
+                  <a:schemeClr val="bg2">
+                    <a:lumMod val="50000"/>
+                  </a:schemeClr>
+                </a:solidFill>
+              </a:rPr>
               <a:t>contribuiu</a:t>
             </a:r>
             <a:r>
-              <a:rPr lang="en-US" dirty="0"/>
+              <a:rPr lang="en-US" dirty="0">
+                <a:solidFill>
+                  <a:schemeClr val="bg2">
+                    <a:lumMod val="50000"/>
+                  </a:schemeClr>
+                </a:solidFill>
+              </a:rPr>
               <a:t> para que </a:t>
             </a:r>
             <a:r>
-              <a:rPr lang="en-US" dirty="0" err="1"/>
+              <a:rPr lang="en-US" dirty="0" err="1">
+                <a:solidFill>
+                  <a:schemeClr val="bg2">
+                    <a:lumMod val="50000"/>
+                  </a:schemeClr>
+                </a:solidFill>
+              </a:rPr>
               <a:t>não</a:t>
             </a:r>
             <a:r>
-              <a:rPr lang="en-US" dirty="0"/>
+              <a:rPr lang="en-US" dirty="0">
+                <a:solidFill>
+                  <a:schemeClr val="bg2">
+                    <a:lumMod val="50000"/>
+                  </a:schemeClr>
+                </a:solidFill>
+              </a:rPr>
               <a:t> </a:t>
             </a:r>
             <a:r>
-              <a:rPr lang="en-US" dirty="0" err="1"/>
+              <a:rPr lang="en-US" dirty="0" err="1">
+                <a:solidFill>
+                  <a:schemeClr val="bg2">
+                    <a:lumMod val="50000"/>
+                  </a:schemeClr>
+                </a:solidFill>
+              </a:rPr>
               <a:t>entregassemos</a:t>
             </a:r>
             <a:r>
-              <a:rPr lang="en-US" dirty="0"/>
+              <a:rPr lang="en-US" dirty="0">
+                <a:solidFill>
+                  <a:schemeClr val="bg2">
+                    <a:lumMod val="50000"/>
+                  </a:schemeClr>
+                </a:solidFill>
+              </a:rPr>
               <a:t> </a:t>
             </a:r>
             <a:r>
-              <a:rPr lang="en-US" dirty="0" err="1"/>
+              <a:rPr lang="en-US" dirty="0" err="1">
+                <a:solidFill>
+                  <a:schemeClr val="bg2">
+                    <a:lumMod val="50000"/>
+                  </a:schemeClr>
+                </a:solidFill>
+              </a:rPr>
               <a:t>os</a:t>
             </a:r>
             <a:r>
-              <a:rPr lang="en-US" dirty="0"/>
+              <a:rPr lang="en-US" dirty="0">
+                <a:solidFill>
+                  <a:schemeClr val="bg2">
+                    <a:lumMod val="50000"/>
+                  </a:schemeClr>
+                </a:solidFill>
+              </a:rPr>
               <a:t> bonus</a:t>
             </a:r>
           </a:p>
@@ -4369,204 +5229,498 @@
           <a:lstStyle/>
           <a:p>
             <a:r>
-              <a:rPr lang="en-US" b="1" dirty="0" err="1"/>
+              <a:rPr lang="en-US" b="1" dirty="0" err="1">
+                <a:solidFill>
+                  <a:schemeClr val="bg2">
+                    <a:lumMod val="50000"/>
+                  </a:schemeClr>
+                </a:solidFill>
+              </a:rPr>
               <a:t>Erros</a:t>
             </a:r>
             <a:r>
-              <a:rPr lang="en-US" b="1" dirty="0"/>
+              <a:rPr lang="en-US" b="1" dirty="0">
+                <a:solidFill>
+                  <a:schemeClr val="bg2">
+                    <a:lumMod val="50000"/>
+                  </a:schemeClr>
+                </a:solidFill>
+              </a:rPr>
               <a:t>:</a:t>
             </a:r>
           </a:p>
           <a:p>
             <a:pPr lvl="1"/>
             <a:r>
-              <a:rPr lang="en-US" dirty="0" err="1"/>
+              <a:rPr lang="en-US" dirty="0" err="1">
+                <a:solidFill>
+                  <a:schemeClr val="bg2">
+                    <a:lumMod val="50000"/>
+                  </a:schemeClr>
+                </a:solidFill>
+              </a:rPr>
               <a:t>Ajustes</a:t>
             </a:r>
             <a:r>
-              <a:rPr lang="en-US" dirty="0"/>
+              <a:rPr lang="en-US" dirty="0">
+                <a:solidFill>
+                  <a:schemeClr val="bg2">
+                    <a:lumMod val="50000"/>
+                  </a:schemeClr>
+                </a:solidFill>
+              </a:rPr>
               <a:t> on the fly que </a:t>
             </a:r>
             <a:r>
-              <a:rPr lang="en-US" dirty="0" err="1"/>
+              <a:rPr lang="en-US" dirty="0" err="1">
+                <a:solidFill>
+                  <a:schemeClr val="bg2">
+                    <a:lumMod val="50000"/>
+                  </a:schemeClr>
+                </a:solidFill>
+              </a:rPr>
               <a:t>traziam</a:t>
             </a:r>
             <a:r>
-              <a:rPr lang="en-US" dirty="0"/>
+              <a:rPr lang="en-US" dirty="0">
+                <a:solidFill>
+                  <a:schemeClr val="bg2">
+                    <a:lumMod val="50000"/>
+                  </a:schemeClr>
+                </a:solidFill>
+              </a:rPr>
               <a:t> </a:t>
             </a:r>
             <a:r>
-              <a:rPr lang="en-US" dirty="0" err="1"/>
+              <a:rPr lang="en-US" dirty="0" err="1">
+                <a:solidFill>
+                  <a:schemeClr val="bg2">
+                    <a:lumMod val="50000"/>
+                  </a:schemeClr>
+                </a:solidFill>
+              </a:rPr>
               <a:t>mais</a:t>
             </a:r>
             <a:r>
-              <a:rPr lang="en-US" dirty="0"/>
+              <a:rPr lang="en-US" dirty="0">
+                <a:solidFill>
+                  <a:schemeClr val="bg2">
+                    <a:lumMod val="50000"/>
+                  </a:schemeClr>
+                </a:solidFill>
+              </a:rPr>
               <a:t> </a:t>
             </a:r>
             <a:r>
-              <a:rPr lang="en-US" dirty="0" err="1"/>
+              <a:rPr lang="en-US" dirty="0" err="1">
+                <a:solidFill>
+                  <a:schemeClr val="bg2">
+                    <a:lumMod val="50000"/>
+                  </a:schemeClr>
+                </a:solidFill>
+              </a:rPr>
               <a:t>problemas</a:t>
             </a:r>
-            <a:endParaRPr lang="en-US" dirty="0"/>
+            <a:endParaRPr lang="en-US" dirty="0">
+              <a:solidFill>
+                <a:schemeClr val="bg2">
+                  <a:lumMod val="50000"/>
+                </a:schemeClr>
+              </a:solidFill>
+            </a:endParaRPr>
           </a:p>
           <a:p>
             <a:pPr lvl="1"/>
             <a:r>
-              <a:rPr lang="en-US" dirty="0"/>
+              <a:rPr lang="en-US" dirty="0">
+                <a:solidFill>
+                  <a:schemeClr val="bg2">
+                    <a:lumMod val="50000"/>
+                  </a:schemeClr>
+                </a:solidFill>
+              </a:rPr>
               <a:t>Na </a:t>
             </a:r>
             <a:r>
-              <a:rPr lang="en-US" dirty="0" err="1"/>
+              <a:rPr lang="en-US" dirty="0" err="1">
+                <a:solidFill>
+                  <a:schemeClr val="bg2">
+                    <a:lumMod val="50000"/>
+                  </a:schemeClr>
+                </a:solidFill>
+              </a:rPr>
               <a:t>fase</a:t>
             </a:r>
             <a:r>
-              <a:rPr lang="en-US" dirty="0"/>
+              <a:rPr lang="en-US" dirty="0">
+                <a:solidFill>
+                  <a:schemeClr val="bg2">
+                    <a:lumMod val="50000"/>
+                  </a:schemeClr>
+                </a:solidFill>
+              </a:rPr>
               <a:t> </a:t>
             </a:r>
             <a:r>
-              <a:rPr lang="en-US" dirty="0" err="1"/>
+              <a:rPr lang="en-US" dirty="0" err="1">
+                <a:solidFill>
+                  <a:schemeClr val="bg2">
+                    <a:lumMod val="50000"/>
+                  </a:schemeClr>
+                </a:solidFill>
+              </a:rPr>
               <a:t>inicial</a:t>
             </a:r>
             <a:r>
-              <a:rPr lang="en-US" dirty="0"/>
+              <a:rPr lang="en-US" dirty="0">
+                <a:solidFill>
+                  <a:schemeClr val="bg2">
+                    <a:lumMod val="50000"/>
+                  </a:schemeClr>
+                </a:solidFill>
+              </a:rPr>
               <a:t> </a:t>
             </a:r>
             <a:r>
-              <a:rPr lang="en-US" dirty="0" err="1"/>
+              <a:rPr lang="en-US" dirty="0" err="1">
+                <a:solidFill>
+                  <a:schemeClr val="bg2">
+                    <a:lumMod val="50000"/>
+                  </a:schemeClr>
+                </a:solidFill>
+              </a:rPr>
               <a:t>tentar</a:t>
             </a:r>
             <a:r>
-              <a:rPr lang="en-US" dirty="0"/>
+              <a:rPr lang="en-US" dirty="0">
+                <a:solidFill>
+                  <a:schemeClr val="bg2">
+                    <a:lumMod val="50000"/>
+                  </a:schemeClr>
+                </a:solidFill>
+              </a:rPr>
               <a:t> </a:t>
             </a:r>
             <a:r>
-              <a:rPr lang="en-US" dirty="0" err="1"/>
+              <a:rPr lang="en-US" dirty="0" err="1">
+                <a:solidFill>
+                  <a:schemeClr val="bg2">
+                    <a:lumMod val="50000"/>
+                  </a:schemeClr>
+                </a:solidFill>
+              </a:rPr>
               <a:t>criar</a:t>
             </a:r>
             <a:r>
-              <a:rPr lang="en-US" dirty="0"/>
+              <a:rPr lang="en-US" dirty="0">
+                <a:solidFill>
+                  <a:schemeClr val="bg2">
+                    <a:lumMod val="50000"/>
+                  </a:schemeClr>
+                </a:solidFill>
+              </a:rPr>
               <a:t> “</a:t>
             </a:r>
             <a:r>
-              <a:rPr lang="en-US" dirty="0" err="1"/>
+              <a:rPr lang="en-US" dirty="0" err="1">
+                <a:solidFill>
+                  <a:schemeClr val="bg2">
+                    <a:lumMod val="50000"/>
+                  </a:schemeClr>
+                </a:solidFill>
+              </a:rPr>
               <a:t>atalhos</a:t>
             </a:r>
             <a:r>
-              <a:rPr lang="en-US" dirty="0"/>
+              <a:rPr lang="en-US" dirty="0">
+                <a:solidFill>
+                  <a:schemeClr val="bg2">
+                    <a:lumMod val="50000"/>
+                  </a:schemeClr>
+                </a:solidFill>
+              </a:rPr>
               <a:t>” para testes no </a:t>
             </a:r>
             <a:r>
-              <a:rPr lang="en-US" dirty="0" err="1"/>
+              <a:rPr lang="en-US" dirty="0" err="1">
+                <a:solidFill>
+                  <a:schemeClr val="bg2">
+                    <a:lumMod val="50000"/>
+                  </a:schemeClr>
+                </a:solidFill>
+              </a:rPr>
               <a:t>mongodb</a:t>
             </a:r>
             <a:r>
-              <a:rPr lang="en-US" dirty="0"/>
+              <a:rPr lang="en-US" dirty="0">
+                <a:solidFill>
+                  <a:schemeClr val="bg2">
+                    <a:lumMod val="50000"/>
+                  </a:schemeClr>
+                </a:solidFill>
+              </a:rPr>
               <a:t> e </a:t>
             </a:r>
             <a:r>
-              <a:rPr lang="en-US" dirty="0" err="1"/>
+              <a:rPr lang="en-US" dirty="0" err="1">
+                <a:solidFill>
+                  <a:schemeClr val="bg2">
+                    <a:lumMod val="50000"/>
+                  </a:schemeClr>
+                </a:solidFill>
+              </a:rPr>
               <a:t>isso</a:t>
             </a:r>
             <a:r>
-              <a:rPr lang="en-US" dirty="0"/>
+              <a:rPr lang="en-US" dirty="0">
+                <a:solidFill>
+                  <a:schemeClr val="bg2">
+                    <a:lumMod val="50000"/>
+                  </a:schemeClr>
+                </a:solidFill>
+              </a:rPr>
               <a:t> </a:t>
             </a:r>
             <a:r>
-              <a:rPr lang="en-US" dirty="0" err="1"/>
+              <a:rPr lang="en-US" dirty="0" err="1">
+                <a:solidFill>
+                  <a:schemeClr val="bg2">
+                    <a:lumMod val="50000"/>
+                  </a:schemeClr>
+                </a:solidFill>
+              </a:rPr>
               <a:t>causar</a:t>
             </a:r>
             <a:r>
-              <a:rPr lang="en-US" dirty="0"/>
+              <a:rPr lang="en-US" dirty="0">
+                <a:solidFill>
+                  <a:schemeClr val="bg2">
+                    <a:lumMod val="50000"/>
+                  </a:schemeClr>
+                </a:solidFill>
+              </a:rPr>
               <a:t> </a:t>
             </a:r>
             <a:r>
-              <a:rPr lang="en-US" dirty="0" err="1"/>
+              <a:rPr lang="en-US" dirty="0" err="1">
+                <a:solidFill>
+                  <a:schemeClr val="bg2">
+                    <a:lumMod val="50000"/>
+                  </a:schemeClr>
+                </a:solidFill>
+              </a:rPr>
               <a:t>problemas</a:t>
             </a:r>
             <a:r>
-              <a:rPr lang="en-US" dirty="0"/>
+              <a:rPr lang="en-US" dirty="0">
+                <a:solidFill>
+                  <a:schemeClr val="bg2">
+                    <a:lumMod val="50000"/>
+                  </a:schemeClr>
+                </a:solidFill>
+              </a:rPr>
               <a:t> no Mongoose</a:t>
             </a:r>
           </a:p>
           <a:p>
             <a:pPr lvl="1"/>
-            <a:endParaRPr lang="en-US" dirty="0"/>
+            <a:endParaRPr lang="en-US" dirty="0">
+              <a:solidFill>
+                <a:schemeClr val="bg2">
+                  <a:lumMod val="50000"/>
+                </a:schemeClr>
+              </a:solidFill>
+            </a:endParaRPr>
           </a:p>
           <a:p>
             <a:pPr lvl="1"/>
-            <a:endParaRPr lang="en-US" dirty="0"/>
-          </a:p>
-          <a:p>
-            <a:r>
-              <a:rPr lang="en-US" b="1" dirty="0" err="1"/>
+            <a:endParaRPr lang="en-US" dirty="0">
+              <a:solidFill>
+                <a:schemeClr val="bg2">
+                  <a:lumMod val="50000"/>
+                </a:schemeClr>
+              </a:solidFill>
+            </a:endParaRPr>
+          </a:p>
+          <a:p>
+            <a:r>
+              <a:rPr lang="en-US" b="1" dirty="0" err="1">
+                <a:solidFill>
+                  <a:schemeClr val="bg2">
+                    <a:lumMod val="50000"/>
+                  </a:schemeClr>
+                </a:solidFill>
+              </a:rPr>
               <a:t>Lições</a:t>
             </a:r>
             <a:r>
-              <a:rPr lang="en-US" b="1" dirty="0"/>
+              <a:rPr lang="en-US" b="1" dirty="0">
+                <a:solidFill>
+                  <a:schemeClr val="bg2">
+                    <a:lumMod val="50000"/>
+                  </a:schemeClr>
+                </a:solidFill>
+              </a:rPr>
               <a:t> </a:t>
             </a:r>
             <a:r>
-              <a:rPr lang="en-US" b="1" dirty="0" err="1"/>
+              <a:rPr lang="en-US" b="1" dirty="0" err="1">
+                <a:solidFill>
+                  <a:schemeClr val="bg2">
+                    <a:lumMod val="50000"/>
+                  </a:schemeClr>
+                </a:solidFill>
+              </a:rPr>
               <a:t>aprendidas</a:t>
             </a:r>
-            <a:endParaRPr lang="en-US" b="1" dirty="0"/>
+            <a:endParaRPr lang="en-US" b="1" dirty="0">
+              <a:solidFill>
+                <a:schemeClr val="bg2">
+                  <a:lumMod val="50000"/>
+                </a:schemeClr>
+              </a:solidFill>
+            </a:endParaRPr>
           </a:p>
           <a:p>
             <a:pPr lvl="1"/>
             <a:r>
-              <a:rPr lang="en-US" dirty="0" err="1"/>
+              <a:rPr lang="en-US" dirty="0" err="1">
+                <a:solidFill>
+                  <a:schemeClr val="bg2">
+                    <a:lumMod val="50000"/>
+                  </a:schemeClr>
+                </a:solidFill>
+              </a:rPr>
               <a:t>Planejar</a:t>
             </a:r>
             <a:r>
-              <a:rPr lang="en-US" dirty="0"/>
+              <a:rPr lang="en-US" dirty="0">
+                <a:solidFill>
+                  <a:schemeClr val="bg2">
+                    <a:lumMod val="50000"/>
+                  </a:schemeClr>
+                </a:solidFill>
+              </a:rPr>
               <a:t> </a:t>
             </a:r>
             <a:r>
-              <a:rPr lang="en-US" dirty="0" err="1"/>
+              <a:rPr lang="en-US" dirty="0" err="1">
+                <a:solidFill>
+                  <a:schemeClr val="bg2">
+                    <a:lumMod val="50000"/>
+                  </a:schemeClr>
+                </a:solidFill>
+              </a:rPr>
               <a:t>já</a:t>
             </a:r>
             <a:r>
-              <a:rPr lang="en-US" dirty="0"/>
+              <a:rPr lang="en-US" dirty="0">
+                <a:solidFill>
+                  <a:schemeClr val="bg2">
+                    <a:lumMod val="50000"/>
+                  </a:schemeClr>
+                </a:solidFill>
+              </a:rPr>
               <a:t> </a:t>
             </a:r>
             <a:r>
-              <a:rPr lang="en-US" dirty="0" err="1"/>
+              <a:rPr lang="en-US" dirty="0" err="1">
+                <a:solidFill>
+                  <a:schemeClr val="bg2">
+                    <a:lumMod val="50000"/>
+                  </a:schemeClr>
+                </a:solidFill>
+              </a:rPr>
               <a:t>na</a:t>
             </a:r>
             <a:r>
-              <a:rPr lang="en-US" dirty="0"/>
+              <a:rPr lang="en-US" dirty="0">
+                <a:solidFill>
+                  <a:schemeClr val="bg2">
+                    <a:lumMod val="50000"/>
+                  </a:schemeClr>
+                </a:solidFill>
+              </a:rPr>
               <a:t> </a:t>
             </a:r>
             <a:r>
-              <a:rPr lang="en-US" dirty="0" err="1"/>
+              <a:rPr lang="en-US" dirty="0" err="1">
+                <a:solidFill>
+                  <a:schemeClr val="bg2">
+                    <a:lumMod val="50000"/>
+                  </a:schemeClr>
+                </a:solidFill>
+              </a:rPr>
               <a:t>fase</a:t>
             </a:r>
             <a:r>
-              <a:rPr lang="en-US" dirty="0"/>
+              <a:rPr lang="en-US" dirty="0">
+                <a:solidFill>
+                  <a:schemeClr val="bg2">
+                    <a:lumMod val="50000"/>
+                  </a:schemeClr>
+                </a:solidFill>
+              </a:rPr>
               <a:t> final testes e </a:t>
             </a:r>
             <a:r>
-              <a:rPr lang="en-US" dirty="0" err="1"/>
+              <a:rPr lang="en-US" dirty="0" err="1">
+                <a:solidFill>
+                  <a:schemeClr val="bg2">
+                    <a:lumMod val="50000"/>
+                  </a:schemeClr>
+                </a:solidFill>
+              </a:rPr>
               <a:t>inserção</a:t>
             </a:r>
             <a:r>
-              <a:rPr lang="en-US" dirty="0"/>
+              <a:rPr lang="en-US" dirty="0">
+                <a:solidFill>
+                  <a:schemeClr val="bg2">
+                    <a:lumMod val="50000"/>
+                  </a:schemeClr>
+                </a:solidFill>
+              </a:rPr>
               <a:t> </a:t>
             </a:r>
             <a:r>
-              <a:rPr lang="en-US" dirty="0" err="1"/>
+              <a:rPr lang="en-US" dirty="0" err="1">
+                <a:solidFill>
+                  <a:schemeClr val="bg2">
+                    <a:lumMod val="50000"/>
+                  </a:schemeClr>
+                </a:solidFill>
+              </a:rPr>
               <a:t>dedados</a:t>
             </a:r>
             <a:r>
-              <a:rPr lang="en-US" dirty="0"/>
+              <a:rPr lang="en-US" dirty="0">
+                <a:solidFill>
+                  <a:schemeClr val="bg2">
+                    <a:lumMod val="50000"/>
+                  </a:schemeClr>
+                </a:solidFill>
+              </a:rPr>
               <a:t> para </a:t>
             </a:r>
             <a:r>
-              <a:rPr lang="en-US" dirty="0" err="1"/>
+              <a:rPr lang="en-US" dirty="0" err="1">
+                <a:solidFill>
+                  <a:schemeClr val="bg2">
+                    <a:lumMod val="50000"/>
+                  </a:schemeClr>
+                </a:solidFill>
+              </a:rPr>
               <a:t>validar</a:t>
             </a:r>
             <a:r>
-              <a:rPr lang="en-US" dirty="0"/>
+              <a:rPr lang="en-US" dirty="0">
+                <a:solidFill>
+                  <a:schemeClr val="bg2">
+                    <a:lumMod val="50000"/>
+                  </a:schemeClr>
+                </a:solidFill>
+              </a:rPr>
               <a:t> testes</a:t>
             </a:r>
           </a:p>
@@ -5258,31 +6412,6 @@
           <a:chExt cx="0" cy="0"/>
         </a:xfrm>
       </p:grpSpPr>
-      <p:sp>
-        <p:nvSpPr>
-          <p:cNvPr id="3" name="Content Placeholder 2">
-            <a:extLst>
-              <a:ext uri="{FF2B5EF4-FFF2-40B4-BE49-F238E27FC236}">
-                <a16:creationId xmlns:a16="http://schemas.microsoft.com/office/drawing/2014/main" id="{D503555C-84E8-49E1-87C1-C372325D9840}"/>
-              </a:ext>
-            </a:extLst>
-          </p:cNvPr>
-          <p:cNvSpPr>
-            <a:spLocks noGrp="1"/>
-          </p:cNvSpPr>
-          <p:nvPr>
-            <p:ph idx="1"/>
-          </p:nvPr>
-        </p:nvSpPr>
-        <p:spPr/>
-        <p:txBody>
-          <a:bodyPr/>
-          <a:lstStyle/>
-          <a:p>
-            <a:endParaRPr lang="en-US" dirty="0"/>
-          </a:p>
-        </p:txBody>
-      </p:sp>
       <p:sp>
         <p:nvSpPr>
           <p:cNvPr id="4" name="Rectangle 3">

</xml_diff>